<commit_message>
change poster add extended date to posters
</commit_message>
<xml_diff>
--- a/materials/poster/poster-en.pptx
+++ b/materials/poster/poster-en.pptx
@@ -7,6 +7,7 @@
   <p:sldIdLst>
     <p:sldId id="258" r:id="rId2"/>
     <p:sldId id="259" r:id="rId3"/>
+    <p:sldId id="260" r:id="rId4"/>
   </p:sldIdLst>
   <p:sldSz cx="6858000" cy="9906000" type="A4"/>
   <p:notesSz cx="6858000" cy="9144000"/>
@@ -275,7 +276,7 @@
           <a:p>
             <a:fld id="{8324406B-F6EF-4086-931F-D80CBBED250D}" type="datetimeFigureOut">
               <a:rPr lang="en-US" smtClean="0"/>
-              <a:t>4/28/2021</a:t>
+              <a:t>5/21/2021</a:t>
             </a:fld>
             <a:endParaRPr lang="en-US"/>
           </a:p>
@@ -445,7 +446,7 @@
           <a:p>
             <a:fld id="{8324406B-F6EF-4086-931F-D80CBBED250D}" type="datetimeFigureOut">
               <a:rPr lang="en-US" smtClean="0"/>
-              <a:t>4/28/2021</a:t>
+              <a:t>5/21/2021</a:t>
             </a:fld>
             <a:endParaRPr lang="en-US"/>
           </a:p>
@@ -625,7 +626,7 @@
           <a:p>
             <a:fld id="{8324406B-F6EF-4086-931F-D80CBBED250D}" type="datetimeFigureOut">
               <a:rPr lang="en-US" smtClean="0"/>
-              <a:t>4/28/2021</a:t>
+              <a:t>5/21/2021</a:t>
             </a:fld>
             <a:endParaRPr lang="en-US"/>
           </a:p>
@@ -795,7 +796,7 @@
           <a:p>
             <a:fld id="{8324406B-F6EF-4086-931F-D80CBBED250D}" type="datetimeFigureOut">
               <a:rPr lang="en-US" smtClean="0"/>
-              <a:t>4/28/2021</a:t>
+              <a:t>5/21/2021</a:t>
             </a:fld>
             <a:endParaRPr lang="en-US"/>
           </a:p>
@@ -1039,7 +1040,7 @@
           <a:p>
             <a:fld id="{8324406B-F6EF-4086-931F-D80CBBED250D}" type="datetimeFigureOut">
               <a:rPr lang="en-US" smtClean="0"/>
-              <a:t>4/28/2021</a:t>
+              <a:t>5/21/2021</a:t>
             </a:fld>
             <a:endParaRPr lang="en-US"/>
           </a:p>
@@ -1271,7 +1272,7 @@
           <a:p>
             <a:fld id="{8324406B-F6EF-4086-931F-D80CBBED250D}" type="datetimeFigureOut">
               <a:rPr lang="en-US" smtClean="0"/>
-              <a:t>4/28/2021</a:t>
+              <a:t>5/21/2021</a:t>
             </a:fld>
             <a:endParaRPr lang="en-US"/>
           </a:p>
@@ -1638,7 +1639,7 @@
           <a:p>
             <a:fld id="{8324406B-F6EF-4086-931F-D80CBBED250D}" type="datetimeFigureOut">
               <a:rPr lang="en-US" smtClean="0"/>
-              <a:t>4/28/2021</a:t>
+              <a:t>5/21/2021</a:t>
             </a:fld>
             <a:endParaRPr lang="en-US"/>
           </a:p>
@@ -1756,7 +1757,7 @@
           <a:p>
             <a:fld id="{8324406B-F6EF-4086-931F-D80CBBED250D}" type="datetimeFigureOut">
               <a:rPr lang="en-US" smtClean="0"/>
-              <a:t>4/28/2021</a:t>
+              <a:t>5/21/2021</a:t>
             </a:fld>
             <a:endParaRPr lang="en-US"/>
           </a:p>
@@ -1851,7 +1852,7 @@
           <a:p>
             <a:fld id="{8324406B-F6EF-4086-931F-D80CBBED250D}" type="datetimeFigureOut">
               <a:rPr lang="en-US" smtClean="0"/>
-              <a:t>4/28/2021</a:t>
+              <a:t>5/21/2021</a:t>
             </a:fld>
             <a:endParaRPr lang="en-US"/>
           </a:p>
@@ -2128,7 +2129,7 @@
           <a:p>
             <a:fld id="{8324406B-F6EF-4086-931F-D80CBBED250D}" type="datetimeFigureOut">
               <a:rPr lang="en-US" smtClean="0"/>
-              <a:t>4/28/2021</a:t>
+              <a:t>5/21/2021</a:t>
             </a:fld>
             <a:endParaRPr lang="en-US"/>
           </a:p>
@@ -2385,7 +2386,7 @@
           <a:p>
             <a:fld id="{8324406B-F6EF-4086-931F-D80CBBED250D}" type="datetimeFigureOut">
               <a:rPr lang="en-US" smtClean="0"/>
-              <a:t>4/28/2021</a:t>
+              <a:t>5/21/2021</a:t>
             </a:fld>
             <a:endParaRPr lang="en-US"/>
           </a:p>
@@ -2598,7 +2599,7 @@
           <a:p>
             <a:fld id="{8324406B-F6EF-4086-931F-D80CBBED250D}" type="datetimeFigureOut">
               <a:rPr lang="en-US" smtClean="0"/>
-              <a:t>4/28/2021</a:t>
+              <a:t>5/21/2021</a:t>
             </a:fld>
             <a:endParaRPr lang="en-US"/>
           </a:p>
@@ -4541,11 +4542,7 @@
               </a:r>
               <a:r>
                 <a:rPr lang="en-US" sz="1300" dirty="0" smtClean="0"/>
-                <a:t> </a:t>
-              </a:r>
-              <a:r>
-                <a:rPr lang="en-US" sz="1300" dirty="0" smtClean="0"/>
-                <a:t>Mahammad-</a:t>
+                <a:t> Mahammad-</a:t>
               </a:r>
               <a:r>
                 <a:rPr lang="en-US" sz="1300" dirty="0" err="1" smtClean="0"/>
@@ -4553,11 +4550,7 @@
               </a:r>
               <a:r>
                 <a:rPr lang="en-US" sz="1300" dirty="0" smtClean="0"/>
-                <a:t> </a:t>
-              </a:r>
-              <a:r>
-                <a:rPr lang="en-US" sz="1300" dirty="0" smtClean="0"/>
-                <a:t>(IASBS)</a:t>
+                <a:t> (IASBS)</a:t>
               </a:r>
             </a:p>
             <a:p>
@@ -5137,6 +5130,1131 @@
     <p:extLst>
       <p:ext uri="{BB962C8B-B14F-4D97-AF65-F5344CB8AC3E}">
         <p14:creationId xmlns:p14="http://schemas.microsoft.com/office/powerpoint/2010/main" val="4035038235"/>
+      </p:ext>
+    </p:extLst>
+  </p:cSld>
+  <p:clrMapOvr>
+    <a:masterClrMapping/>
+  </p:clrMapOvr>
+  <p:timing>
+    <p:tnLst>
+      <p:par>
+        <p:cTn id="1" dur="indefinite" restart="never" nodeType="tmRoot"/>
+      </p:par>
+    </p:tnLst>
+  </p:timing>
+</p:sld>
+</file>
+
+<file path=ppt/slides/slide3.xml><?xml version="1.0" encoding="utf-8"?>
+<p:sld xmlns:a="http://schemas.openxmlformats.org/drawingml/2006/main" xmlns:r="http://schemas.openxmlformats.org/officeDocument/2006/relationships" xmlns:p="http://schemas.openxmlformats.org/presentationml/2006/main">
+  <p:cSld>
+    <p:bg>
+      <p:bgPr>
+        <a:solidFill>
+          <a:schemeClr val="accent3">
+            <a:lumMod val="20000"/>
+            <a:lumOff val="80000"/>
+          </a:schemeClr>
+        </a:solidFill>
+        <a:effectLst/>
+      </p:bgPr>
+    </p:bg>
+    <p:spTree>
+      <p:nvGrpSpPr>
+        <p:cNvPr id="1" name=""/>
+        <p:cNvGrpSpPr/>
+        <p:nvPr/>
+      </p:nvGrpSpPr>
+      <p:grpSpPr>
+        <a:xfrm>
+          <a:off x="0" y="0"/>
+          <a:ext cx="0" cy="0"/>
+          <a:chOff x="0" y="0"/>
+          <a:chExt cx="0" cy="0"/>
+        </a:xfrm>
+      </p:grpSpPr>
+      <p:sp>
+        <p:nvSpPr>
+          <p:cNvPr id="4" name="Rounded Rectangle 3"/>
+          <p:cNvSpPr/>
+          <p:nvPr/>
+        </p:nvSpPr>
+        <p:spPr>
+          <a:xfrm>
+            <a:off x="137160" y="152400"/>
+            <a:ext cx="6583680" cy="9601201"/>
+          </a:xfrm>
+          <a:prstGeom prst="roundRect">
+            <a:avLst>
+              <a:gd name="adj" fmla="val 2280"/>
+            </a:avLst>
+          </a:prstGeom>
+          <a:solidFill>
+            <a:schemeClr val="bg1"/>
+          </a:solidFill>
+          <a:ln w="38100">
+            <a:solidFill>
+              <a:schemeClr val="tx1"/>
+            </a:solidFill>
+          </a:ln>
+        </p:spPr>
+        <p:style>
+          <a:lnRef idx="2">
+            <a:schemeClr val="accent1">
+              <a:shade val="50000"/>
+            </a:schemeClr>
+          </a:lnRef>
+          <a:fillRef idx="1">
+            <a:schemeClr val="accent1"/>
+          </a:fillRef>
+          <a:effectRef idx="0">
+            <a:schemeClr val="accent1"/>
+          </a:effectRef>
+          <a:fontRef idx="minor">
+            <a:schemeClr val="lt1"/>
+          </a:fontRef>
+        </p:style>
+        <p:txBody>
+          <a:bodyPr rtlCol="0" anchor="ctr"/>
+          <a:lstStyle/>
+          <a:p>
+            <a:pPr algn="ctr"/>
+            <a:endParaRPr lang="en-US"/>
+          </a:p>
+        </p:txBody>
+      </p:sp>
+      <p:sp>
+        <p:nvSpPr>
+          <p:cNvPr id="5" name="TextBox 4"/>
+          <p:cNvSpPr txBox="1"/>
+          <p:nvPr/>
+        </p:nvSpPr>
+        <p:spPr>
+          <a:xfrm>
+            <a:off x="1871256" y="533400"/>
+            <a:ext cx="3114029" cy="646331"/>
+          </a:xfrm>
+          <a:prstGeom prst="rect">
+            <a:avLst/>
+          </a:prstGeom>
+          <a:noFill/>
+        </p:spPr>
+        <p:txBody>
+          <a:bodyPr wrap="square" rtlCol="0">
+            <a:spAutoFit/>
+          </a:bodyPr>
+          <a:lstStyle/>
+          <a:p>
+            <a:pPr algn="ctr"/>
+            <a:r>
+              <a:rPr lang="en-US" b="1" dirty="0" smtClean="0">
+                <a:solidFill>
+                  <a:srgbClr val="C00000"/>
+                </a:solidFill>
+              </a:rPr>
+              <a:t>26</a:t>
+            </a:r>
+            <a:r>
+              <a:rPr lang="en-US" b="1" baseline="30000" dirty="0" smtClean="0">
+                <a:solidFill>
+                  <a:srgbClr val="C00000"/>
+                </a:solidFill>
+              </a:rPr>
+              <a:t>th</a:t>
+            </a:r>
+            <a:r>
+              <a:rPr lang="en-US" b="1" dirty="0" smtClean="0">
+                <a:solidFill>
+                  <a:srgbClr val="C00000"/>
+                </a:solidFill>
+              </a:rPr>
+              <a:t> Annual IASBS Meeting on Condensed Matter Physics</a:t>
+            </a:r>
+            <a:endParaRPr lang="en-US" b="1" dirty="0">
+              <a:solidFill>
+                <a:srgbClr val="C00000"/>
+              </a:solidFill>
+            </a:endParaRPr>
+          </a:p>
+        </p:txBody>
+      </p:sp>
+      <p:pic>
+        <p:nvPicPr>
+          <p:cNvPr id="6" name="Picture 5"/>
+          <p:cNvPicPr>
+            <a:picLocks noChangeAspect="1"/>
+          </p:cNvPicPr>
+          <p:nvPr/>
+        </p:nvPicPr>
+        <p:blipFill rotWithShape="1">
+          <a:blip r:embed="rId2">
+            <a:extLst>
+              <a:ext uri="{28A0092B-C50C-407E-A947-70E740481C1C}">
+                <a14:useLocalDpi xmlns:a14="http://schemas.microsoft.com/office/drawing/2010/main" val="0"/>
+              </a:ext>
+            </a:extLst>
+          </a:blip>
+          <a:srcRect b="30546"/>
+          <a:stretch/>
+        </p:blipFill>
+        <p:spPr>
+          <a:xfrm>
+            <a:off x="232163" y="533400"/>
+            <a:ext cx="1231076" cy="855032"/>
+          </a:xfrm>
+          <a:prstGeom prst="rect">
+            <a:avLst/>
+          </a:prstGeom>
+        </p:spPr>
+      </p:pic>
+      <p:pic>
+        <p:nvPicPr>
+          <p:cNvPr id="7" name="Picture 6"/>
+          <p:cNvPicPr>
+            <a:picLocks noChangeAspect="1"/>
+          </p:cNvPicPr>
+          <p:nvPr/>
+        </p:nvPicPr>
+        <p:blipFill>
+          <a:blip r:embed="rId3">
+            <a:extLst>
+              <a:ext uri="{28A0092B-C50C-407E-A947-70E740481C1C}">
+                <a14:useLocalDpi xmlns:a14="http://schemas.microsoft.com/office/drawing/2010/main" val="0"/>
+              </a:ext>
+            </a:extLst>
+          </a:blip>
+          <a:stretch>
+            <a:fillRect/>
+          </a:stretch>
+        </p:blipFill>
+        <p:spPr>
+          <a:xfrm>
+            <a:off x="5152752" y="533400"/>
+            <a:ext cx="1520735" cy="855032"/>
+          </a:xfrm>
+          <a:prstGeom prst="rect">
+            <a:avLst/>
+          </a:prstGeom>
+        </p:spPr>
+      </p:pic>
+      <p:pic>
+        <p:nvPicPr>
+          <p:cNvPr id="8" name="Picture 7"/>
+          <p:cNvPicPr>
+            <a:picLocks noChangeAspect="1"/>
+          </p:cNvPicPr>
+          <p:nvPr/>
+        </p:nvPicPr>
+        <p:blipFill>
+          <a:blip r:embed="rId4">
+            <a:extLst>
+              <a:ext uri="{28A0092B-C50C-407E-A947-70E740481C1C}">
+                <a14:useLocalDpi xmlns:a14="http://schemas.microsoft.com/office/drawing/2010/main" val="0"/>
+              </a:ext>
+            </a:extLst>
+          </a:blip>
+          <a:stretch>
+            <a:fillRect/>
+          </a:stretch>
+        </p:blipFill>
+        <p:spPr>
+          <a:xfrm>
+            <a:off x="228600" y="1554480"/>
+            <a:ext cx="6400800" cy="2231137"/>
+          </a:xfrm>
+          <a:prstGeom prst="rect">
+            <a:avLst/>
+          </a:prstGeom>
+        </p:spPr>
+      </p:pic>
+      <p:sp>
+        <p:nvSpPr>
+          <p:cNvPr id="10" name="TextBox 9"/>
+          <p:cNvSpPr txBox="1"/>
+          <p:nvPr/>
+        </p:nvSpPr>
+        <p:spPr>
+          <a:xfrm>
+            <a:off x="232163" y="3954856"/>
+            <a:ext cx="6441323" cy="1384995"/>
+          </a:xfrm>
+          <a:prstGeom prst="rect">
+            <a:avLst/>
+          </a:prstGeom>
+          <a:noFill/>
+        </p:spPr>
+        <p:txBody>
+          <a:bodyPr wrap="square" rtlCol="0">
+            <a:spAutoFit/>
+          </a:bodyPr>
+          <a:lstStyle/>
+          <a:p>
+            <a:pPr algn="just"/>
+            <a:r>
+              <a:rPr lang="en-US" sz="1400" dirty="0" smtClean="0"/>
+              <a:t>The 26</a:t>
+            </a:r>
+            <a:r>
+              <a:rPr lang="en-US" sz="1400" baseline="30000" dirty="0" smtClean="0"/>
+              <a:t>th</a:t>
+            </a:r>
+            <a:r>
+              <a:rPr lang="en-US" sz="1400" dirty="0" smtClean="0"/>
+              <a:t> annual IASBS meeting on condensed matter physics will </a:t>
+            </a:r>
+            <a:r>
+              <a:rPr lang="en-US" sz="1400" dirty="0"/>
+              <a:t>be held </a:t>
+            </a:r>
+            <a:r>
+              <a:rPr lang="en-US" sz="1400" b="1" dirty="0"/>
+              <a:t>online</a:t>
+            </a:r>
+            <a:r>
+              <a:rPr lang="en-US" sz="1400" dirty="0"/>
+              <a:t> this </a:t>
+            </a:r>
+            <a:r>
+              <a:rPr lang="en-US" sz="1400" dirty="0" smtClean="0"/>
+              <a:t>year. The aim of this meeting is to bring together experimental and theoretical scientists in the fields of </a:t>
+            </a:r>
+            <a:r>
+              <a:rPr lang="en-US" sz="1400" b="1" dirty="0" smtClean="0"/>
+              <a:t>condensed matter, soft matter &amp; biological physics, and complex systems</a:t>
+            </a:r>
+            <a:r>
+              <a:rPr lang="en-US" sz="1400" dirty="0" smtClean="0"/>
+              <a:t> to present their most recent research and to create an atmosphere for fruitful discussion. The poster session provides an excellent opportunity for young researchers and students to gain invaluable experience through online discussion.</a:t>
+            </a:r>
+            <a:endParaRPr lang="en-US" sz="1400" dirty="0"/>
+          </a:p>
+        </p:txBody>
+      </p:sp>
+      <p:grpSp>
+        <p:nvGrpSpPr>
+          <p:cNvPr id="18" name="Group 17"/>
+          <p:cNvGrpSpPr/>
+          <p:nvPr/>
+        </p:nvGrpSpPr>
+        <p:grpSpPr>
+          <a:xfrm>
+            <a:off x="3511549" y="7091365"/>
+            <a:ext cx="3117850" cy="1814913"/>
+            <a:chOff x="257810" y="6910928"/>
+            <a:chExt cx="3117850" cy="1333847"/>
+          </a:xfrm>
+        </p:grpSpPr>
+        <p:sp>
+          <p:nvSpPr>
+            <p:cNvPr id="17" name="Rounded Rectangle 16"/>
+            <p:cNvSpPr/>
+            <p:nvPr/>
+          </p:nvSpPr>
+          <p:spPr>
+            <a:xfrm>
+              <a:off x="257810" y="6910928"/>
+              <a:ext cx="3117850" cy="1333847"/>
+            </a:xfrm>
+            <a:prstGeom prst="roundRect">
+              <a:avLst>
+                <a:gd name="adj" fmla="val 3460"/>
+              </a:avLst>
+            </a:prstGeom>
+            <a:solidFill>
+              <a:schemeClr val="accent3">
+                <a:lumMod val="20000"/>
+                <a:lumOff val="80000"/>
+              </a:schemeClr>
+            </a:solidFill>
+            <a:ln w="19050">
+              <a:solidFill>
+                <a:srgbClr val="C00000"/>
+              </a:solidFill>
+            </a:ln>
+          </p:spPr>
+          <p:style>
+            <a:lnRef idx="2">
+              <a:schemeClr val="accent1">
+                <a:shade val="50000"/>
+              </a:schemeClr>
+            </a:lnRef>
+            <a:fillRef idx="1">
+              <a:schemeClr val="accent1"/>
+            </a:fillRef>
+            <a:effectRef idx="0">
+              <a:schemeClr val="accent1"/>
+            </a:effectRef>
+            <a:fontRef idx="minor">
+              <a:schemeClr val="lt1"/>
+            </a:fontRef>
+          </p:style>
+          <p:txBody>
+            <a:bodyPr rtlCol="0" anchor="ctr"/>
+            <a:lstStyle/>
+            <a:p>
+              <a:pPr algn="ctr"/>
+              <a:endParaRPr lang="en-US"/>
+            </a:p>
+          </p:txBody>
+        </p:sp>
+        <p:sp>
+          <p:nvSpPr>
+            <p:cNvPr id="11" name="TextBox 10"/>
+            <p:cNvSpPr txBox="1"/>
+            <p:nvPr/>
+          </p:nvSpPr>
+          <p:spPr>
+            <a:xfrm>
+              <a:off x="305365" y="6962999"/>
+              <a:ext cx="3022740" cy="1221461"/>
+            </a:xfrm>
+            <a:prstGeom prst="rect">
+              <a:avLst/>
+            </a:prstGeom>
+            <a:noFill/>
+            <a:ln>
+              <a:noFill/>
+            </a:ln>
+          </p:spPr>
+          <p:txBody>
+            <a:bodyPr wrap="square" rtlCol="0">
+              <a:spAutoFit/>
+            </a:bodyPr>
+            <a:lstStyle/>
+            <a:p>
+              <a:endParaRPr lang="en-US" sz="100" b="1" dirty="0" smtClean="0"/>
+            </a:p>
+            <a:p>
+              <a:endParaRPr lang="en-US" sz="100" b="1" dirty="0" smtClean="0"/>
+            </a:p>
+            <a:p>
+              <a:endParaRPr lang="en-US" sz="100" b="1" dirty="0" smtClean="0"/>
+            </a:p>
+            <a:p>
+              <a:endParaRPr lang="en-US" sz="100" b="1" dirty="0" smtClean="0"/>
+            </a:p>
+            <a:p>
+              <a:endParaRPr lang="en-US" sz="100" b="1" dirty="0"/>
+            </a:p>
+            <a:p>
+              <a:r>
+                <a:rPr lang="en-US" sz="1400" b="1" dirty="0">
+                  <a:solidFill>
+                    <a:srgbClr val="A00000"/>
+                  </a:solidFill>
+                </a:rPr>
+                <a:t>Scientific Committee:</a:t>
+              </a:r>
+            </a:p>
+            <a:p>
+              <a:endParaRPr lang="en-US" sz="100" b="1" dirty="0" smtClean="0"/>
+            </a:p>
+            <a:p>
+              <a:r>
+                <a:rPr lang="en-US" sz="1300" dirty="0" err="1" smtClean="0"/>
+                <a:t>Davood</a:t>
+              </a:r>
+              <a:r>
+                <a:rPr lang="en-US" sz="1300" dirty="0" smtClean="0"/>
+                <a:t> </a:t>
+              </a:r>
+              <a:r>
+                <a:rPr lang="en-US" sz="1300" dirty="0" err="1" smtClean="0"/>
+                <a:t>Abbaszadeh</a:t>
+              </a:r>
+              <a:r>
+                <a:rPr lang="en-US" sz="1300" dirty="0" smtClean="0"/>
+                <a:t> (IASBS)</a:t>
+              </a:r>
+            </a:p>
+            <a:p>
+              <a:r>
+                <a:rPr lang="en-US" sz="1300" dirty="0" smtClean="0"/>
+                <a:t>Saeed </a:t>
+              </a:r>
+              <a:r>
+                <a:rPr lang="en-US" sz="1300" dirty="0" err="1" smtClean="0"/>
+                <a:t>Abedinpour</a:t>
+              </a:r>
+              <a:r>
+                <a:rPr lang="en-US" sz="1300" dirty="0" smtClean="0"/>
+                <a:t> (IASBS)</a:t>
+              </a:r>
+            </a:p>
+            <a:p>
+              <a:r>
+                <a:rPr lang="en-US" sz="1300" dirty="0" smtClean="0"/>
+                <a:t>Zahra </a:t>
+              </a:r>
+              <a:r>
+                <a:rPr lang="en-US" sz="1300" dirty="0" err="1" smtClean="0"/>
+                <a:t>Faraei</a:t>
+              </a:r>
+              <a:r>
+                <a:rPr lang="en-US" sz="1300" dirty="0" smtClean="0"/>
+                <a:t> (IASBS)</a:t>
+              </a:r>
+            </a:p>
+            <a:p>
+              <a:r>
+                <a:rPr lang="en-US" sz="1300" dirty="0" err="1" smtClean="0"/>
+                <a:t>Farshid</a:t>
+              </a:r>
+              <a:r>
+                <a:rPr lang="en-US" sz="1300" dirty="0" smtClean="0"/>
+                <a:t> Mahammad-</a:t>
+              </a:r>
+              <a:r>
+                <a:rPr lang="en-US" sz="1300" dirty="0" err="1" smtClean="0"/>
+                <a:t>Rafiee</a:t>
+              </a:r>
+              <a:r>
+                <a:rPr lang="en-US" sz="1300" dirty="0" smtClean="0"/>
+                <a:t> (IASBS)</a:t>
+              </a:r>
+            </a:p>
+            <a:p>
+              <a:r>
+                <a:rPr lang="en-US" sz="1300" dirty="0" err="1" smtClean="0"/>
+                <a:t>Alireza</a:t>
+              </a:r>
+              <a:r>
+                <a:rPr lang="en-US" sz="1300" dirty="0" smtClean="0"/>
+                <a:t> </a:t>
+              </a:r>
+              <a:r>
+                <a:rPr lang="en-US" sz="1300" dirty="0" err="1" smtClean="0"/>
+                <a:t>Valizadeh</a:t>
+              </a:r>
+              <a:r>
+                <a:rPr lang="en-US" sz="1300" dirty="0" smtClean="0"/>
+                <a:t> (IASBS), </a:t>
+              </a:r>
+              <a:r>
+                <a:rPr lang="en-US" sz="1300" b="1" dirty="0" smtClean="0"/>
+                <a:t>Chair</a:t>
+              </a:r>
+            </a:p>
+            <a:p>
+              <a:r>
+                <a:rPr lang="en-US" sz="1300" dirty="0" smtClean="0"/>
+                <a:t>Mina </a:t>
+              </a:r>
+              <a:r>
+                <a:rPr lang="en-US" sz="1300" dirty="0" err="1" smtClean="0"/>
+                <a:t>Zarei</a:t>
+              </a:r>
+              <a:r>
+                <a:rPr lang="en-US" sz="1300" dirty="0" smtClean="0"/>
+                <a:t> (IASBS)</a:t>
+              </a:r>
+            </a:p>
+          </p:txBody>
+        </p:sp>
+      </p:grpSp>
+      <p:sp>
+        <p:nvSpPr>
+          <p:cNvPr id="23" name="TextBox 22"/>
+          <p:cNvSpPr txBox="1"/>
+          <p:nvPr/>
+        </p:nvSpPr>
+        <p:spPr>
+          <a:xfrm>
+            <a:off x="2058127" y="1108288"/>
+            <a:ext cx="2758663" cy="338554"/>
+          </a:xfrm>
+          <a:prstGeom prst="rect">
+            <a:avLst/>
+          </a:prstGeom>
+          <a:noFill/>
+        </p:spPr>
+        <p:txBody>
+          <a:bodyPr wrap="square" rtlCol="0">
+            <a:spAutoFit/>
+          </a:bodyPr>
+          <a:lstStyle/>
+          <a:p>
+            <a:r>
+              <a:rPr lang="en-US" sz="1600" b="1" dirty="0" smtClean="0"/>
+              <a:t>July 7-9, 2021 (16-18 </a:t>
+            </a:r>
+            <a:r>
+              <a:rPr lang="en-US" sz="1600" b="1" dirty="0" err="1" smtClean="0"/>
+              <a:t>Tir</a:t>
+            </a:r>
+            <a:r>
+              <a:rPr lang="en-US" sz="1600" b="1" dirty="0" smtClean="0"/>
+              <a:t> 1400)</a:t>
+            </a:r>
+          </a:p>
+        </p:txBody>
+      </p:sp>
+      <p:grpSp>
+        <p:nvGrpSpPr>
+          <p:cNvPr id="25" name="Group 24"/>
+          <p:cNvGrpSpPr/>
+          <p:nvPr/>
+        </p:nvGrpSpPr>
+        <p:grpSpPr>
+          <a:xfrm>
+            <a:off x="228600" y="9040926"/>
+            <a:ext cx="6400799" cy="737497"/>
+            <a:chOff x="3449188" y="6492852"/>
+            <a:chExt cx="3224298" cy="1293572"/>
+          </a:xfrm>
+        </p:grpSpPr>
+        <p:sp>
+          <p:nvSpPr>
+            <p:cNvPr id="26" name="Rounded Rectangle 25"/>
+            <p:cNvSpPr/>
+            <p:nvPr/>
+          </p:nvSpPr>
+          <p:spPr>
+            <a:xfrm>
+              <a:off x="3449188" y="6492852"/>
+              <a:ext cx="3224298" cy="1064576"/>
+            </a:xfrm>
+            <a:prstGeom prst="roundRect">
+              <a:avLst>
+                <a:gd name="adj" fmla="val 13528"/>
+              </a:avLst>
+            </a:prstGeom>
+            <a:solidFill>
+              <a:schemeClr val="accent3">
+                <a:lumMod val="20000"/>
+                <a:lumOff val="80000"/>
+              </a:schemeClr>
+            </a:solidFill>
+            <a:ln w="19050">
+              <a:solidFill>
+                <a:srgbClr val="C00000"/>
+              </a:solidFill>
+            </a:ln>
+          </p:spPr>
+          <p:style>
+            <a:lnRef idx="2">
+              <a:schemeClr val="accent1">
+                <a:shade val="50000"/>
+              </a:schemeClr>
+            </a:lnRef>
+            <a:fillRef idx="1">
+              <a:schemeClr val="accent1"/>
+            </a:fillRef>
+            <a:effectRef idx="0">
+              <a:schemeClr val="accent1"/>
+            </a:effectRef>
+            <a:fontRef idx="minor">
+              <a:schemeClr val="lt1"/>
+            </a:fontRef>
+          </p:style>
+          <p:txBody>
+            <a:bodyPr rtlCol="0" anchor="ctr"/>
+            <a:lstStyle/>
+            <a:p>
+              <a:pPr algn="ctr"/>
+              <a:endParaRPr lang="en-US"/>
+            </a:p>
+          </p:txBody>
+        </p:sp>
+        <p:sp>
+          <p:nvSpPr>
+            <p:cNvPr id="27" name="TextBox 26"/>
+            <p:cNvSpPr txBox="1"/>
+            <p:nvPr/>
+          </p:nvSpPr>
+          <p:spPr>
+            <a:xfrm>
+              <a:off x="3449188" y="6652758"/>
+              <a:ext cx="3224298" cy="1133666"/>
+            </a:xfrm>
+            <a:prstGeom prst="rect">
+              <a:avLst/>
+            </a:prstGeom>
+            <a:noFill/>
+          </p:spPr>
+          <p:txBody>
+            <a:bodyPr wrap="square" rtlCol="0">
+              <a:spAutoFit/>
+            </a:bodyPr>
+            <a:lstStyle/>
+            <a:p>
+              <a:r>
+                <a:rPr lang="en-US" sz="1200" b="1" dirty="0" smtClean="0"/>
+                <a:t>Address: </a:t>
+              </a:r>
+              <a:r>
+                <a:rPr lang="en-US" sz="1200" dirty="0" smtClean="0"/>
+                <a:t>Institute for advanced studies in basic sciences (IASBS), PO Box 45195-1159, </a:t>
+              </a:r>
+              <a:r>
+                <a:rPr lang="en-US" sz="1200" dirty="0" err="1" smtClean="0"/>
+                <a:t>Zanjan</a:t>
+              </a:r>
+              <a:r>
+                <a:rPr lang="en-US" sz="1200" dirty="0" smtClean="0"/>
+                <a:t>, Iran,</a:t>
+              </a:r>
+            </a:p>
+            <a:p>
+              <a:pPr algn="ctr"/>
+              <a:r>
+                <a:rPr lang="en-US" sz="1200" b="1" dirty="0" smtClean="0"/>
+                <a:t>Tel</a:t>
+              </a:r>
+              <a:r>
+                <a:rPr lang="en-US" sz="1200" dirty="0" smtClean="0"/>
+                <a:t>: (+98)24 3315 2204, </a:t>
+              </a:r>
+              <a:r>
+                <a:rPr lang="en-US" sz="1200" b="1" dirty="0" smtClean="0"/>
+                <a:t>Fax</a:t>
+              </a:r>
+              <a:r>
+                <a:rPr lang="en-US" sz="1200" dirty="0" smtClean="0"/>
+                <a:t>: (+98) 3315 2104</a:t>
+              </a:r>
+            </a:p>
+            <a:p>
+              <a:endParaRPr lang="en-US" sz="1200" dirty="0" smtClean="0"/>
+            </a:p>
+          </p:txBody>
+        </p:sp>
+      </p:grpSp>
+      <p:sp>
+        <p:nvSpPr>
+          <p:cNvPr id="29" name="Rounded Rectangle 28"/>
+          <p:cNvSpPr/>
+          <p:nvPr/>
+        </p:nvSpPr>
+        <p:spPr>
+          <a:xfrm>
+            <a:off x="228600" y="7091364"/>
+            <a:ext cx="3136535" cy="1814907"/>
+          </a:xfrm>
+          <a:prstGeom prst="roundRect">
+            <a:avLst>
+              <a:gd name="adj" fmla="val 3336"/>
+            </a:avLst>
+          </a:prstGeom>
+          <a:solidFill>
+            <a:schemeClr val="accent3">
+              <a:lumMod val="20000"/>
+              <a:lumOff val="80000"/>
+            </a:schemeClr>
+          </a:solidFill>
+          <a:ln w="19050">
+            <a:solidFill>
+              <a:srgbClr val="C00000"/>
+            </a:solidFill>
+          </a:ln>
+        </p:spPr>
+        <p:style>
+          <a:lnRef idx="2">
+            <a:schemeClr val="accent1">
+              <a:shade val="50000"/>
+            </a:schemeClr>
+          </a:lnRef>
+          <a:fillRef idx="1">
+            <a:schemeClr val="accent1"/>
+          </a:fillRef>
+          <a:effectRef idx="0">
+            <a:schemeClr val="accent1"/>
+          </a:effectRef>
+          <a:fontRef idx="minor">
+            <a:schemeClr val="lt1"/>
+          </a:fontRef>
+        </p:style>
+        <p:txBody>
+          <a:bodyPr rtlCol="0" anchor="ctr"/>
+          <a:lstStyle/>
+          <a:p>
+            <a:pPr algn="ctr"/>
+            <a:endParaRPr lang="en-US"/>
+          </a:p>
+        </p:txBody>
+      </p:sp>
+      <p:sp>
+        <p:nvSpPr>
+          <p:cNvPr id="30" name="TextBox 29"/>
+          <p:cNvSpPr txBox="1"/>
+          <p:nvPr/>
+        </p:nvSpPr>
+        <p:spPr>
+          <a:xfrm>
+            <a:off x="284164" y="7237705"/>
+            <a:ext cx="2997200" cy="1184940"/>
+          </a:xfrm>
+          <a:prstGeom prst="rect">
+            <a:avLst/>
+          </a:prstGeom>
+          <a:noFill/>
+        </p:spPr>
+        <p:txBody>
+          <a:bodyPr wrap="square" rtlCol="0">
+            <a:spAutoFit/>
+          </a:bodyPr>
+          <a:lstStyle/>
+          <a:p>
+            <a:r>
+              <a:rPr lang="en-US" sz="1400" b="1" dirty="0" smtClean="0">
+                <a:solidFill>
+                  <a:srgbClr val="A00000"/>
+                </a:solidFill>
+              </a:rPr>
+              <a:t>Registration and Abstract Submission</a:t>
+            </a:r>
+          </a:p>
+          <a:p>
+            <a:endParaRPr lang="en-US" sz="700" dirty="0" smtClean="0"/>
+          </a:p>
+          <a:p>
+            <a:r>
+              <a:rPr lang="en-US" sz="1300" dirty="0" smtClean="0"/>
+              <a:t>For </a:t>
+            </a:r>
+            <a:r>
+              <a:rPr lang="en-US" sz="1300" dirty="0"/>
+              <a:t>registration </a:t>
+            </a:r>
+            <a:r>
+              <a:rPr lang="en-US" sz="1300" dirty="0" smtClean="0"/>
+              <a:t>and abstract </a:t>
+            </a:r>
+            <a:r>
+              <a:rPr lang="en-US" sz="1300" dirty="0"/>
+              <a:t>submission visit</a:t>
+            </a:r>
+            <a:r>
+              <a:rPr lang="en-US" sz="1300" dirty="0" smtClean="0"/>
+              <a:t>:</a:t>
+            </a:r>
+          </a:p>
+          <a:p>
+            <a:endParaRPr lang="en-US" sz="1300" dirty="0"/>
+          </a:p>
+          <a:p>
+            <a:r>
+              <a:rPr lang="en-US" sz="1100" b="1" dirty="0"/>
+              <a:t>http</a:t>
+            </a:r>
+            <a:r>
+              <a:rPr lang="en-US" sz="1100" b="1"/>
+              <a:t>://</a:t>
+            </a:r>
+            <a:r>
+              <a:rPr lang="en-US" sz="1100" b="1" smtClean="0"/>
+              <a:t>www.psi.ir/f/meetingcm26</a:t>
+            </a:r>
+            <a:endParaRPr lang="fa-IR" sz="1100" b="1" dirty="0"/>
+          </a:p>
+        </p:txBody>
+      </p:sp>
+      <p:pic>
+        <p:nvPicPr>
+          <p:cNvPr id="3" name="Picture 2"/>
+          <p:cNvPicPr>
+            <a:picLocks noChangeAspect="1"/>
+          </p:cNvPicPr>
+          <p:nvPr/>
+        </p:nvPicPr>
+        <p:blipFill>
+          <a:blip r:embed="rId5" cstate="print">
+            <a:clrChange>
+              <a:clrFrom>
+                <a:srgbClr val="FFFFFF"/>
+              </a:clrFrom>
+              <a:clrTo>
+                <a:srgbClr val="FFFFFF">
+                  <a:alpha val="0"/>
+                </a:srgbClr>
+              </a:clrTo>
+            </a:clrChange>
+            <a:extLst>
+              <a:ext uri="{28A0092B-C50C-407E-A947-70E740481C1C}">
+                <a14:useLocalDpi xmlns:a14="http://schemas.microsoft.com/office/drawing/2010/main" val="0"/>
+              </a:ext>
+            </a:extLst>
+          </a:blip>
+          <a:stretch>
+            <a:fillRect/>
+          </a:stretch>
+        </p:blipFill>
+        <p:spPr>
+          <a:xfrm>
+            <a:off x="2577800" y="8145489"/>
+            <a:ext cx="576000" cy="576000"/>
+          </a:xfrm>
+          <a:prstGeom prst="rect">
+            <a:avLst/>
+          </a:prstGeom>
+        </p:spPr>
+      </p:pic>
+      <p:grpSp>
+        <p:nvGrpSpPr>
+          <p:cNvPr id="13" name="Group 12"/>
+          <p:cNvGrpSpPr/>
+          <p:nvPr/>
+        </p:nvGrpSpPr>
+        <p:grpSpPr>
+          <a:xfrm>
+            <a:off x="1502858" y="5537999"/>
+            <a:ext cx="3869199" cy="1252540"/>
+            <a:chOff x="1314451" y="5534024"/>
+            <a:chExt cx="3869199" cy="1252540"/>
+          </a:xfrm>
+        </p:grpSpPr>
+        <p:sp>
+          <p:nvSpPr>
+            <p:cNvPr id="15" name="Rounded Rectangle 14"/>
+            <p:cNvSpPr/>
+            <p:nvPr/>
+          </p:nvSpPr>
+          <p:spPr>
+            <a:xfrm>
+              <a:off x="1314452" y="5534024"/>
+              <a:ext cx="3869198" cy="1252540"/>
+            </a:xfrm>
+            <a:prstGeom prst="roundRect">
+              <a:avLst>
+                <a:gd name="adj" fmla="val 7348"/>
+              </a:avLst>
+            </a:prstGeom>
+            <a:solidFill>
+              <a:schemeClr val="accent3">
+                <a:lumMod val="20000"/>
+                <a:lumOff val="80000"/>
+              </a:schemeClr>
+            </a:solidFill>
+            <a:ln w="19050">
+              <a:solidFill>
+                <a:srgbClr val="C00000"/>
+              </a:solidFill>
+            </a:ln>
+          </p:spPr>
+          <p:style>
+            <a:lnRef idx="2">
+              <a:schemeClr val="accent1">
+                <a:shade val="50000"/>
+              </a:schemeClr>
+            </a:lnRef>
+            <a:fillRef idx="1">
+              <a:schemeClr val="accent1"/>
+            </a:fillRef>
+            <a:effectRef idx="0">
+              <a:schemeClr val="accent1"/>
+            </a:effectRef>
+            <a:fontRef idx="minor">
+              <a:schemeClr val="lt1"/>
+            </a:fontRef>
+          </p:style>
+          <p:txBody>
+            <a:bodyPr rtlCol="0" anchor="ctr"/>
+            <a:lstStyle/>
+            <a:p>
+              <a:pPr algn="ctr"/>
+              <a:endParaRPr lang="en-US"/>
+            </a:p>
+          </p:txBody>
+        </p:sp>
+        <p:sp>
+          <p:nvSpPr>
+            <p:cNvPr id="12" name="TextBox 11"/>
+            <p:cNvSpPr txBox="1"/>
+            <p:nvPr/>
+          </p:nvSpPr>
+          <p:spPr>
+            <a:xfrm>
+              <a:off x="1314451" y="5601710"/>
+              <a:ext cx="3846980" cy="677108"/>
+            </a:xfrm>
+            <a:prstGeom prst="rect">
+              <a:avLst/>
+            </a:prstGeom>
+            <a:noFill/>
+          </p:spPr>
+          <p:txBody>
+            <a:bodyPr wrap="square" rtlCol="0">
+              <a:spAutoFit/>
+            </a:bodyPr>
+            <a:lstStyle/>
+            <a:p>
+              <a:pPr algn="ctr"/>
+              <a:r>
+                <a:rPr lang="en-US" sz="1400" b="1" dirty="0" smtClean="0">
+                  <a:solidFill>
+                    <a:srgbClr val="A00000"/>
+                  </a:solidFill>
+                </a:rPr>
+                <a:t>Deadline for registration and abstract submission</a:t>
+              </a:r>
+            </a:p>
+            <a:p>
+              <a:pPr algn="ctr"/>
+              <a:r>
+                <a:rPr lang="en-US" sz="1200" b="1" dirty="0" smtClean="0"/>
+                <a:t>May 21, 2021 (31 </a:t>
+              </a:r>
+              <a:r>
+                <a:rPr lang="en-US" sz="1200" b="1" dirty="0" err="1" smtClean="0"/>
+                <a:t>Ordibehesht</a:t>
+              </a:r>
+              <a:r>
+                <a:rPr lang="en-US" sz="1200" b="1" dirty="0" smtClean="0"/>
+                <a:t> 1400)</a:t>
+              </a:r>
+            </a:p>
+            <a:p>
+              <a:pPr algn="ctr"/>
+              <a:r>
+                <a:rPr lang="en-US" sz="1200" b="1" dirty="0" smtClean="0"/>
+                <a:t>June 5, 2021(15 </a:t>
+              </a:r>
+              <a:r>
+                <a:rPr lang="en-US" sz="1200" b="1" dirty="0" err="1" smtClean="0"/>
+                <a:t>Khordad</a:t>
+              </a:r>
+              <a:r>
+                <a:rPr lang="en-US" sz="1200" b="1" dirty="0" smtClean="0"/>
+                <a:t> 1400)</a:t>
+              </a:r>
+              <a:endParaRPr lang="en-US" sz="1200" b="1" dirty="0"/>
+            </a:p>
+          </p:txBody>
+        </p:sp>
+        <p:sp>
+          <p:nvSpPr>
+            <p:cNvPr id="22" name="TextBox 21"/>
+            <p:cNvSpPr txBox="1"/>
+            <p:nvPr/>
+          </p:nvSpPr>
+          <p:spPr>
+            <a:xfrm>
+              <a:off x="1347788" y="6242229"/>
+              <a:ext cx="2800350" cy="430887"/>
+            </a:xfrm>
+            <a:prstGeom prst="rect">
+              <a:avLst/>
+            </a:prstGeom>
+            <a:noFill/>
+          </p:spPr>
+          <p:txBody>
+            <a:bodyPr wrap="square" rtlCol="0">
+              <a:spAutoFit/>
+            </a:bodyPr>
+            <a:lstStyle/>
+            <a:p>
+              <a:r>
+                <a:rPr lang="en-US" sz="1100" dirty="0" smtClean="0"/>
+                <a:t>For more information visit:</a:t>
+              </a:r>
+              <a:endParaRPr lang="en-US" sz="1100" dirty="0"/>
+            </a:p>
+            <a:p>
+              <a:r>
+                <a:rPr lang="en-US" sz="1100" b="1" dirty="0"/>
+                <a:t>https://iasbs.ac.ir/~condmat-meeting/m26</a:t>
+              </a:r>
+            </a:p>
+          </p:txBody>
+        </p:sp>
+        <p:pic>
+          <p:nvPicPr>
+            <p:cNvPr id="2" name="Picture 1"/>
+            <p:cNvPicPr>
+              <a:picLocks noChangeAspect="1"/>
+            </p:cNvPicPr>
+            <p:nvPr/>
+          </p:nvPicPr>
+          <p:blipFill>
+            <a:blip r:embed="rId6" cstate="print">
+              <a:clrChange>
+                <a:clrFrom>
+                  <a:srgbClr val="FFFFFF"/>
+                </a:clrFrom>
+                <a:clrTo>
+                  <a:srgbClr val="FFFFFF">
+                    <a:alpha val="0"/>
+                  </a:srgbClr>
+                </a:clrTo>
+              </a:clrChange>
+              <a:extLst>
+                <a:ext uri="{28A0092B-C50C-407E-A947-70E740481C1C}">
+                  <a14:useLocalDpi xmlns:a14="http://schemas.microsoft.com/office/drawing/2010/main" val="0"/>
+                </a:ext>
+              </a:extLst>
+            </a:blip>
+            <a:stretch>
+              <a:fillRect/>
+            </a:stretch>
+          </p:blipFill>
+          <p:spPr>
+            <a:xfrm>
+              <a:off x="4528790" y="6124023"/>
+              <a:ext cx="576000" cy="576000"/>
+            </a:xfrm>
+            <a:prstGeom prst="rect">
+              <a:avLst/>
+            </a:prstGeom>
+          </p:spPr>
+        </p:pic>
+      </p:grpSp>
+      <p:sp>
+        <p:nvSpPr>
+          <p:cNvPr id="9" name="Minus 8"/>
+          <p:cNvSpPr/>
+          <p:nvPr/>
+        </p:nvSpPr>
+        <p:spPr>
+          <a:xfrm>
+            <a:off x="1536195" y="5917176"/>
+            <a:ext cx="3757002" cy="91440"/>
+          </a:xfrm>
+          <a:prstGeom prst="mathMinus">
+            <a:avLst/>
+          </a:prstGeom>
+          <a:solidFill>
+            <a:srgbClr val="FF0000"/>
+          </a:solidFill>
+          <a:ln>
+            <a:solidFill>
+              <a:srgbClr val="FF0000"/>
+            </a:solidFill>
+          </a:ln>
+        </p:spPr>
+        <p:style>
+          <a:lnRef idx="2">
+            <a:schemeClr val="accent1">
+              <a:shade val="50000"/>
+            </a:schemeClr>
+          </a:lnRef>
+          <a:fillRef idx="1">
+            <a:schemeClr val="accent1"/>
+          </a:fillRef>
+          <a:effectRef idx="0">
+            <a:schemeClr val="accent1"/>
+          </a:effectRef>
+          <a:fontRef idx="minor">
+            <a:schemeClr val="lt1"/>
+          </a:fontRef>
+        </p:style>
+        <p:txBody>
+          <a:bodyPr rtlCol="0" anchor="ctr"/>
+          <a:lstStyle/>
+          <a:p>
+            <a:pPr algn="ctr"/>
+            <a:endParaRPr lang="en-US">
+              <a:solidFill>
+                <a:srgbClr val="FF0000"/>
+              </a:solidFill>
+            </a:endParaRPr>
+          </a:p>
+        </p:txBody>
+      </p:sp>
+    </p:spTree>
+    <p:extLst>
+      <p:ext uri="{BB962C8B-B14F-4D97-AF65-F5344CB8AC3E}">
+        <p14:creationId xmlns:p14="http://schemas.microsoft.com/office/powerpoint/2010/main" val="2509897329"/>
       </p:ext>
     </p:extLst>
   </p:cSld>

</xml_diff>

<commit_message>
change externded date from may 5 to may 4
</commit_message>
<xml_diff>
--- a/materials/poster/poster-en.pptx
+++ b/materials/poster/poster-en.pptx
@@ -6108,7 +6108,15 @@
               <a:pPr algn="ctr"/>
               <a:r>
                 <a:rPr lang="en-US" sz="1200" b="1" dirty="0" smtClean="0"/>
-                <a:t>June 5, 2021(15 </a:t>
+                <a:t>June </a:t>
+              </a:r>
+              <a:r>
+                <a:rPr lang="en-US" sz="1200" b="1" dirty="0" smtClean="0"/>
+                <a:t>4</a:t>
+              </a:r>
+              <a:r>
+                <a:rPr lang="en-US" sz="1200" b="1" smtClean="0"/>
+                <a:t>, 2021(14 </a:t>
               </a:r>
               <a:r>
                 <a:rPr lang="en-US" sz="1200" b="1" dirty="0" err="1" smtClean="0"/>

</xml_diff>